<commit_message>
Spell Checks -- Updated
</commit_message>
<xml_diff>
--- a/DAA Project.pptx
+++ b/DAA Project.pptx
@@ -6006,7 +6006,7 @@
                 <a:latin typeface="Times New Roman" panose="02020603050405020304" pitchFamily="18" charset="0"/>
                 <a:cs typeface="Times New Roman" panose="02020603050405020304" pitchFamily="18" charset="0"/>
               </a:rPr>
-              <a:t> By visualizing SLA performance metrics? </a:t>
+              <a:t> by visualizing SLA performance metrics? </a:t>
             </a:r>
           </a:p>
           <a:p>
@@ -6205,6 +6205,25 @@
             </a:r>
           </a:p>
           <a:p>
+            <a:pPr lvl="1"/>
+            <a:endParaRPr lang="en-US" dirty="0">
+              <a:latin typeface="Times New Roman" panose="02020603050405020304" pitchFamily="18" charset="0"/>
+              <a:cs typeface="Times New Roman" panose="02020603050405020304" pitchFamily="18" charset="0"/>
+            </a:endParaRPr>
+          </a:p>
+          <a:p>
+            <a:pPr marL="457200" lvl="1" indent="0">
+              <a:buNone/>
+            </a:pPr>
+            <a:r>
+              <a:rPr lang="en-US" dirty="0">
+                <a:latin typeface="Times New Roman" panose="02020603050405020304" pitchFamily="18" charset="0"/>
+                <a:cs typeface="Times New Roman" panose="02020603050405020304" pitchFamily="18" charset="0"/>
+              </a:rPr>
+              <a:t> </a:t>
+            </a:r>
+          </a:p>
+          <a:p>
             <a:endParaRPr lang="en-US" dirty="0"/>
           </a:p>
           <a:p>
@@ -6289,7 +6308,12 @@
             <p:ph idx="1"/>
           </p:nvPr>
         </p:nvSpPr>
-        <p:spPr/>
+        <p:spPr>
+          <a:xfrm>
+            <a:off x="677334" y="1488613"/>
+            <a:ext cx="8596668" cy="3880773"/>
+          </a:xfrm>
+        </p:spPr>
         <p:txBody>
           <a:bodyPr/>
           <a:lstStyle/>
@@ -6445,7 +6469,7 @@
                 <a:latin typeface="Times New Roman" panose="02020603050405020304" pitchFamily="18" charset="0"/>
                 <a:cs typeface="Times New Roman" panose="02020603050405020304" pitchFamily="18" charset="0"/>
               </a:rPr>
-              <a:t>In which location metal detectors are used the maximum?</a:t>
+              <a:t>In which locations metal detectors are used the maximum?</a:t>
             </a:r>
           </a:p>
           <a:p>

</xml_diff>